<commit_message>
Update TCR graph results for pres
</commit_message>
<xml_diff>
--- a/presentations/weekly_meetings/3_28_24.pptx
+++ b/presentations/weekly_meetings/3_28_24.pptx
@@ -5,14 +5,16 @@
     <p:sldMasterId id="2147483648" r:id="rId1"/>
   </p:sldMasterIdLst>
   <p:notesMasterIdLst>
-    <p:notesMasterId r:id="rId7"/>
+    <p:notesMasterId r:id="rId9"/>
   </p:notesMasterIdLst>
   <p:sldIdLst>
     <p:sldId id="477" r:id="rId2"/>
     <p:sldId id="499" r:id="rId3"/>
     <p:sldId id="584" r:id="rId4"/>
-    <p:sldId id="548" r:id="rId5"/>
-    <p:sldId id="586" r:id="rId6"/>
+    <p:sldId id="587" r:id="rId5"/>
+    <p:sldId id="588" r:id="rId6"/>
+    <p:sldId id="548" r:id="rId7"/>
+    <p:sldId id="586" r:id="rId8"/>
   </p:sldIdLst>
   <p:sldSz cx="12192000" cy="6858000"/>
   <p:notesSz cx="6858000" cy="9144000"/>
@@ -212,7 +214,7 @@
           <a:p>
             <a:fld id="{E933A773-0DCE-3544-BB67-D5FA58DF903C}" type="datetimeFigureOut">
               <a:rPr lang="en-US" smtClean="0"/>
-              <a:t>3/25/24</a:t>
+              <a:t>3/27/24</a:t>
             </a:fld>
             <a:endParaRPr lang="en-US"/>
           </a:p>
@@ -1132,7 +1134,7 @@
         <p:cNvPr id="1" name="">
           <a:extLst>
             <a:ext uri="{FF2B5EF4-FFF2-40B4-BE49-F238E27FC236}">
-              <a16:creationId xmlns:a16="http://schemas.microsoft.com/office/drawing/2014/main" id="{3415C166-0F50-E043-8950-9F266C4565AE}"/>
+              <a16:creationId xmlns:a16="http://schemas.microsoft.com/office/drawing/2014/main" id="{9F9CF0A4-89BE-440E-07EB-666A96F6E1EE}"/>
             </a:ext>
           </a:extLst>
         </p:cNvPr>
@@ -1152,7 +1154,7 @@
           <p:cNvPr id="2" name="Slide Image Placeholder 1">
             <a:extLst>
               <a:ext uri="{FF2B5EF4-FFF2-40B4-BE49-F238E27FC236}">
-                <a16:creationId xmlns:a16="http://schemas.microsoft.com/office/drawing/2014/main" id="{1E497E09-6D11-D0BA-D2D1-5B08FB997731}"/>
+                <a16:creationId xmlns:a16="http://schemas.microsoft.com/office/drawing/2014/main" id="{DF8072BA-DEFE-DBBB-99A4-7F06F3DBECCC}"/>
               </a:ext>
             </a:extLst>
           </p:cNvPr>
@@ -1170,7 +1172,7 @@
           <p:cNvPr id="3" name="Notes Placeholder 2">
             <a:extLst>
               <a:ext uri="{FF2B5EF4-FFF2-40B4-BE49-F238E27FC236}">
-                <a16:creationId xmlns:a16="http://schemas.microsoft.com/office/drawing/2014/main" id="{9336C4A5-58A4-D062-54A6-1D67A978E992}"/>
+                <a16:creationId xmlns:a16="http://schemas.microsoft.com/office/drawing/2014/main" id="{8DC89EBE-22A2-E8F9-0B5E-00B34ED77017}"/>
               </a:ext>
             </a:extLst>
           </p:cNvPr>
@@ -1186,6 +1188,92 @@
           <a:bodyPr/>
           <a:lstStyle/>
           <a:p>
+            <a:pPr marL="0" marR="0" lvl="0" indent="0" algn="l" defTabSz="914400" rtl="0" eaLnBrk="1" fontAlgn="auto" latinLnBrk="0" hangingPunct="1">
+              <a:lnSpc>
+                <a:spcPct val="100000"/>
+              </a:lnSpc>
+              <a:spcBef>
+                <a:spcPts val="0"/>
+              </a:spcBef>
+              <a:spcAft>
+                <a:spcPts val="0"/>
+              </a:spcAft>
+              <a:buClrTx/>
+              <a:buSzTx/>
+              <a:buFontTx/>
+              <a:buNone/>
+              <a:tabLst/>
+              <a:defRPr/>
+            </a:pPr>
+            <a:r>
+              <a:rPr lang="en-US" b="0" dirty="0">
+                <a:solidFill>
+                  <a:srgbClr val="CCCCCC"/>
+                </a:solidFill>
+                <a:effectLst/>
+                <a:latin typeface="Menlo" panose="020B0609030804020204" pitchFamily="49" charset="0"/>
+              </a:rPr>
+              <a:t>MKI67 probably looks same because there are so few proliferating cells and difference between </a:t>
+            </a:r>
+            <a:r>
+              <a:rPr lang="en-US" b="0" dirty="0" err="1">
+                <a:solidFill>
+                  <a:srgbClr val="CCCCCC"/>
+                </a:solidFill>
+                <a:effectLst/>
+                <a:latin typeface="Menlo" panose="020B0609030804020204" pitchFamily="49" charset="0"/>
+              </a:rPr>
+              <a:t>irAE</a:t>
+            </a:r>
+            <a:r>
+              <a:rPr lang="en-US" b="0" dirty="0">
+                <a:solidFill>
+                  <a:srgbClr val="CCCCCC"/>
+                </a:solidFill>
+                <a:effectLst/>
+                <a:latin typeface="Menlo" panose="020B0609030804020204" pitchFamily="49" charset="0"/>
+              </a:rPr>
+              <a:t> groups wasn’t even </a:t>
+            </a:r>
+            <a:r>
+              <a:rPr lang="en-US" b="0" dirty="0" err="1">
+                <a:solidFill>
+                  <a:srgbClr val="CCCCCC"/>
+                </a:solidFill>
+                <a:effectLst/>
+                <a:latin typeface="Menlo" panose="020B0609030804020204" pitchFamily="49" charset="0"/>
+              </a:rPr>
+              <a:t>huuge</a:t>
+            </a:r>
+            <a:r>
+              <a:rPr lang="en-US" b="0" dirty="0">
+                <a:solidFill>
+                  <a:srgbClr val="CCCCCC"/>
+                </a:solidFill>
+                <a:effectLst/>
+                <a:latin typeface="Menlo" panose="020B0609030804020204" pitchFamily="49" charset="0"/>
+              </a:rPr>
+              <a:t> in proliferating cells alone</a:t>
+            </a:r>
+          </a:p>
+          <a:p>
+            <a:pPr marL="0" marR="0" lvl="0" indent="0" algn="l" defTabSz="914400" rtl="0" eaLnBrk="1" fontAlgn="auto" latinLnBrk="0" hangingPunct="1">
+              <a:lnSpc>
+                <a:spcPct val="100000"/>
+              </a:lnSpc>
+              <a:spcBef>
+                <a:spcPts val="0"/>
+              </a:spcBef>
+              <a:spcAft>
+                <a:spcPts val="0"/>
+              </a:spcAft>
+              <a:buClrTx/>
+              <a:buSzTx/>
+              <a:buFontTx/>
+              <a:buNone/>
+              <a:tabLst/>
+              <a:defRPr/>
+            </a:pPr>
             <a:endParaRPr lang="en-US" b="0" dirty="0">
               <a:solidFill>
                 <a:srgbClr val="CCCCCC"/>
@@ -1194,6 +1282,55 @@
               <a:latin typeface="Menlo" panose="020B0609030804020204" pitchFamily="49" charset="0"/>
             </a:endParaRPr>
           </a:p>
+          <a:p>
+            <a:pPr marL="0" marR="0" lvl="0" indent="0" algn="l" defTabSz="914400" rtl="0" eaLnBrk="1" fontAlgn="auto" latinLnBrk="0" hangingPunct="1">
+              <a:lnSpc>
+                <a:spcPct val="100000"/>
+              </a:lnSpc>
+              <a:spcBef>
+                <a:spcPts val="0"/>
+              </a:spcBef>
+              <a:spcAft>
+                <a:spcPts val="0"/>
+              </a:spcAft>
+              <a:buClrTx/>
+              <a:buSzTx/>
+              <a:buFontTx/>
+              <a:buNone/>
+              <a:tabLst/>
+              <a:defRPr/>
+            </a:pPr>
+            <a:r>
+              <a:rPr lang="en-US" b="0" dirty="0">
+                <a:solidFill>
+                  <a:srgbClr val="CCCCCC"/>
+                </a:solidFill>
+                <a:effectLst/>
+                <a:latin typeface="Menlo" panose="020B0609030804020204" pitchFamily="49" charset="0"/>
+              </a:rPr>
+              <a:t>Did for all T cells, CD4 </a:t>
+            </a:r>
+            <a:r>
+              <a:rPr lang="en-US" b="0" dirty="0" err="1">
+                <a:solidFill>
+                  <a:srgbClr val="CCCCCC"/>
+                </a:solidFill>
+                <a:effectLst/>
+                <a:latin typeface="Menlo" panose="020B0609030804020204" pitchFamily="49" charset="0"/>
+              </a:rPr>
+              <a:t>prolifs</a:t>
+            </a:r>
+            <a:r>
+              <a:rPr lang="en-US" b="0" dirty="0">
+                <a:solidFill>
+                  <a:srgbClr val="CCCCCC"/>
+                </a:solidFill>
+                <a:effectLst/>
+                <a:latin typeface="Menlo" panose="020B0609030804020204" pitchFamily="49" charset="0"/>
+              </a:rPr>
+              <a:t>, didn’t try for all CD4s but yea not expecting anything…</a:t>
+            </a:r>
+          </a:p>
         </p:txBody>
       </p:sp>
       <p:sp>
@@ -1201,7 +1338,7 @@
           <p:cNvPr id="4" name="Slide Number Placeholder 3">
             <a:extLst>
               <a:ext uri="{FF2B5EF4-FFF2-40B4-BE49-F238E27FC236}">
-                <a16:creationId xmlns:a16="http://schemas.microsoft.com/office/drawing/2014/main" id="{9F3FD3E1-ECA8-7789-76B9-A150DB6276EE}"/>
+                <a16:creationId xmlns:a16="http://schemas.microsoft.com/office/drawing/2014/main" id="{F738DF2F-359D-75F9-6B29-C6819C5ACB43}"/>
               </a:ext>
             </a:extLst>
           </p:cNvPr>
@@ -1228,7 +1365,7 @@
     </p:spTree>
     <p:extLst>
       <p:ext uri="{BB962C8B-B14F-4D97-AF65-F5344CB8AC3E}">
-        <p14:creationId xmlns:p14="http://schemas.microsoft.com/office/powerpoint/2010/main" val="3687655026"/>
+        <p14:creationId xmlns:p14="http://schemas.microsoft.com/office/powerpoint/2010/main" val="2589292344"/>
       </p:ext>
     </p:extLst>
   </p:cSld>
@@ -1239,6 +1376,242 @@
 </file>
 
 <file path=ppt/notesSlides/notesSlide5.xml><?xml version="1.0" encoding="utf-8"?>
+<p:notes xmlns:a="http://schemas.openxmlformats.org/drawingml/2006/main" xmlns:r="http://schemas.openxmlformats.org/officeDocument/2006/relationships" xmlns:p="http://schemas.openxmlformats.org/presentationml/2006/main">
+  <p:cSld>
+    <p:spTree>
+      <p:nvGrpSpPr>
+        <p:cNvPr id="1" name="">
+          <a:extLst>
+            <a:ext uri="{FF2B5EF4-FFF2-40B4-BE49-F238E27FC236}">
+              <a16:creationId xmlns:a16="http://schemas.microsoft.com/office/drawing/2014/main" id="{9F9CF0A4-89BE-440E-07EB-666A96F6E1EE}"/>
+            </a:ext>
+          </a:extLst>
+        </p:cNvPr>
+        <p:cNvGrpSpPr/>
+        <p:nvPr/>
+      </p:nvGrpSpPr>
+      <p:grpSpPr>
+        <a:xfrm>
+          <a:off x="0" y="0"/>
+          <a:ext cx="0" cy="0"/>
+          <a:chOff x="0" y="0"/>
+          <a:chExt cx="0" cy="0"/>
+        </a:xfrm>
+      </p:grpSpPr>
+      <p:sp>
+        <p:nvSpPr>
+          <p:cNvPr id="2" name="Slide Image Placeholder 1">
+            <a:extLst>
+              <a:ext uri="{FF2B5EF4-FFF2-40B4-BE49-F238E27FC236}">
+                <a16:creationId xmlns:a16="http://schemas.microsoft.com/office/drawing/2014/main" id="{DF8072BA-DEFE-DBBB-99A4-7F06F3DBECCC}"/>
+              </a:ext>
+            </a:extLst>
+          </p:cNvPr>
+          <p:cNvSpPr>
+            <a:spLocks noGrp="1" noRot="1" noChangeAspect="1"/>
+          </p:cNvSpPr>
+          <p:nvPr>
+            <p:ph type="sldImg"/>
+          </p:nvPr>
+        </p:nvSpPr>
+        <p:spPr/>
+      </p:sp>
+      <p:sp>
+        <p:nvSpPr>
+          <p:cNvPr id="3" name="Notes Placeholder 2">
+            <a:extLst>
+              <a:ext uri="{FF2B5EF4-FFF2-40B4-BE49-F238E27FC236}">
+                <a16:creationId xmlns:a16="http://schemas.microsoft.com/office/drawing/2014/main" id="{8DC89EBE-22A2-E8F9-0B5E-00B34ED77017}"/>
+              </a:ext>
+            </a:extLst>
+          </p:cNvPr>
+          <p:cNvSpPr>
+            <a:spLocks noGrp="1"/>
+          </p:cNvSpPr>
+          <p:nvPr>
+            <p:ph type="body" idx="1"/>
+          </p:nvPr>
+        </p:nvSpPr>
+        <p:spPr/>
+        <p:txBody>
+          <a:bodyPr/>
+          <a:lstStyle/>
+          <a:p>
+            <a:pPr marL="0" marR="0" lvl="0" indent="0" algn="l" defTabSz="914400" rtl="0" eaLnBrk="1" fontAlgn="auto" latinLnBrk="0" hangingPunct="1">
+              <a:lnSpc>
+                <a:spcPct val="100000"/>
+              </a:lnSpc>
+              <a:spcBef>
+                <a:spcPts val="0"/>
+              </a:spcBef>
+              <a:spcAft>
+                <a:spcPts val="0"/>
+              </a:spcAft>
+              <a:buClrTx/>
+              <a:buSzTx/>
+              <a:buFontTx/>
+              <a:buNone/>
+              <a:tabLst/>
+              <a:defRPr/>
+            </a:pPr>
+            <a:r>
+              <a:rPr lang="en-US" b="0" dirty="0" err="1">
+                <a:solidFill>
+                  <a:srgbClr val="CCCCCC"/>
+                </a:solidFill>
+                <a:effectLst/>
+                <a:latin typeface="Menlo" panose="020B0609030804020204" pitchFamily="49" charset="0"/>
+              </a:rPr>
+              <a:t>average_connectivity</a:t>
+            </a:r>
+            <a:r>
+              <a:rPr lang="en-US" b="0" dirty="0">
+                <a:solidFill>
+                  <a:srgbClr val="CCCCCC"/>
+                </a:solidFill>
+                <a:effectLst/>
+                <a:latin typeface="Menlo" panose="020B0609030804020204" pitchFamily="49" charset="0"/>
+              </a:rPr>
+              <a:t> = 2 * </a:t>
+            </a:r>
+            <a:r>
+              <a:rPr lang="en-US" b="0" dirty="0" err="1">
+                <a:solidFill>
+                  <a:srgbClr val="CCCCCC"/>
+                </a:solidFill>
+                <a:effectLst/>
+                <a:latin typeface="Menlo" panose="020B0609030804020204" pitchFamily="49" charset="0"/>
+              </a:rPr>
+              <a:t>num_edges</a:t>
+            </a:r>
+            <a:r>
+              <a:rPr lang="en-US" b="0" dirty="0">
+                <a:solidFill>
+                  <a:srgbClr val="CCCCCC"/>
+                </a:solidFill>
+                <a:effectLst/>
+                <a:latin typeface="Menlo" panose="020B0609030804020204" pitchFamily="49" charset="0"/>
+              </a:rPr>
+              <a:t> / </a:t>
+            </a:r>
+            <a:r>
+              <a:rPr lang="en-US" b="0" dirty="0" err="1">
+                <a:solidFill>
+                  <a:srgbClr val="CCCCCC"/>
+                </a:solidFill>
+                <a:effectLst/>
+                <a:latin typeface="Menlo" panose="020B0609030804020204" pitchFamily="49" charset="0"/>
+              </a:rPr>
+              <a:t>num_vertices</a:t>
+            </a:r>
+            <a:endParaRPr lang="en-US" b="0" dirty="0">
+              <a:solidFill>
+                <a:srgbClr val="CCCCCC"/>
+              </a:solidFill>
+              <a:effectLst/>
+              <a:latin typeface="Menlo" panose="020B0609030804020204" pitchFamily="49" charset="0"/>
+            </a:endParaRPr>
+          </a:p>
+          <a:p>
+            <a:pPr marL="0" marR="0" lvl="0" indent="0" algn="l" defTabSz="914400" rtl="0" eaLnBrk="1" fontAlgn="auto" latinLnBrk="0" hangingPunct="1">
+              <a:lnSpc>
+                <a:spcPct val="100000"/>
+              </a:lnSpc>
+              <a:spcBef>
+                <a:spcPts val="0"/>
+              </a:spcBef>
+              <a:spcAft>
+                <a:spcPts val="0"/>
+              </a:spcAft>
+              <a:buClrTx/>
+              <a:buSzTx/>
+              <a:buFontTx/>
+              <a:buNone/>
+              <a:tabLst/>
+              <a:defRPr/>
+            </a:pPr>
+            <a:endParaRPr lang="en-US" b="0" dirty="0">
+              <a:solidFill>
+                <a:srgbClr val="CCCCCC"/>
+              </a:solidFill>
+              <a:effectLst/>
+              <a:latin typeface="Menlo" panose="020B0609030804020204" pitchFamily="49" charset="0"/>
+            </a:endParaRPr>
+          </a:p>
+          <a:p>
+            <a:pPr marL="0" marR="0" lvl="0" indent="0" algn="l" defTabSz="914400" rtl="0" eaLnBrk="1" fontAlgn="auto" latinLnBrk="0" hangingPunct="1">
+              <a:lnSpc>
+                <a:spcPct val="100000"/>
+              </a:lnSpc>
+              <a:spcBef>
+                <a:spcPts val="0"/>
+              </a:spcBef>
+              <a:spcAft>
+                <a:spcPts val="0"/>
+              </a:spcAft>
+              <a:buClrTx/>
+              <a:buSzTx/>
+              <a:buFontTx/>
+              <a:buNone/>
+              <a:tabLst/>
+              <a:defRPr/>
+            </a:pPr>
+            <a:r>
+              <a:rPr lang="en-US" b="0" dirty="0">
+                <a:solidFill>
+                  <a:srgbClr val="CCCCCC"/>
+                </a:solidFill>
+                <a:effectLst/>
+                <a:latin typeface="Menlo" panose="020B0609030804020204" pitchFamily="49" charset="0"/>
+              </a:rPr>
+              <a:t>Top 350 clonotypes per patient per chain</a:t>
+            </a:r>
+          </a:p>
+        </p:txBody>
+      </p:sp>
+      <p:sp>
+        <p:nvSpPr>
+          <p:cNvPr id="4" name="Slide Number Placeholder 3">
+            <a:extLst>
+              <a:ext uri="{FF2B5EF4-FFF2-40B4-BE49-F238E27FC236}">
+                <a16:creationId xmlns:a16="http://schemas.microsoft.com/office/drawing/2014/main" id="{F738DF2F-359D-75F9-6B29-C6819C5ACB43}"/>
+              </a:ext>
+            </a:extLst>
+          </p:cNvPr>
+          <p:cNvSpPr>
+            <a:spLocks noGrp="1"/>
+          </p:cNvSpPr>
+          <p:nvPr>
+            <p:ph type="sldNum" sz="quarter" idx="5"/>
+          </p:nvPr>
+        </p:nvSpPr>
+        <p:spPr/>
+        <p:txBody>
+          <a:bodyPr/>
+          <a:lstStyle/>
+          <a:p>
+            <a:fld id="{061BAA8C-FDC6-D345-B4E0-3B02449209FB}" type="slidenum">
+              <a:rPr lang="en-US" smtClean="0"/>
+              <a:t>5</a:t>
+            </a:fld>
+            <a:endParaRPr lang="en-US"/>
+          </a:p>
+        </p:txBody>
+      </p:sp>
+    </p:spTree>
+    <p:extLst>
+      <p:ext uri="{BB962C8B-B14F-4D97-AF65-F5344CB8AC3E}">
+        <p14:creationId xmlns:p14="http://schemas.microsoft.com/office/powerpoint/2010/main" val="1870071336"/>
+      </p:ext>
+    </p:extLst>
+  </p:cSld>
+  <p:clrMapOvr>
+    <a:masterClrMapping/>
+  </p:clrMapOvr>
+</p:notes>
+</file>
+
+<file path=ppt/notesSlides/notesSlide6.xml><?xml version="1.0" encoding="utf-8"?>
 <p:notes xmlns:a="http://schemas.openxmlformats.org/drawingml/2006/main" xmlns:r="http://schemas.openxmlformats.org/officeDocument/2006/relationships" xmlns:p="http://schemas.openxmlformats.org/presentationml/2006/main">
   <p:cSld>
     <p:spTree>
@@ -1333,7 +1706,121 @@
           <a:p>
             <a:fld id="{061BAA8C-FDC6-D345-B4E0-3B02449209FB}" type="slidenum">
               <a:rPr lang="en-US" smtClean="0"/>
-              <a:t>5</a:t>
+              <a:t>6</a:t>
+            </a:fld>
+            <a:endParaRPr lang="en-US"/>
+          </a:p>
+        </p:txBody>
+      </p:sp>
+    </p:spTree>
+    <p:extLst>
+      <p:ext uri="{BB962C8B-B14F-4D97-AF65-F5344CB8AC3E}">
+        <p14:creationId xmlns:p14="http://schemas.microsoft.com/office/powerpoint/2010/main" val="3687655026"/>
+      </p:ext>
+    </p:extLst>
+  </p:cSld>
+  <p:clrMapOvr>
+    <a:masterClrMapping/>
+  </p:clrMapOvr>
+</p:notes>
+</file>
+
+<file path=ppt/notesSlides/notesSlide7.xml><?xml version="1.0" encoding="utf-8"?>
+<p:notes xmlns:a="http://schemas.openxmlformats.org/drawingml/2006/main" xmlns:r="http://schemas.openxmlformats.org/officeDocument/2006/relationships" xmlns:p="http://schemas.openxmlformats.org/presentationml/2006/main">
+  <p:cSld>
+    <p:spTree>
+      <p:nvGrpSpPr>
+        <p:cNvPr id="1" name="">
+          <a:extLst>
+            <a:ext uri="{FF2B5EF4-FFF2-40B4-BE49-F238E27FC236}">
+              <a16:creationId xmlns:a16="http://schemas.microsoft.com/office/drawing/2014/main" id="{3415C166-0F50-E043-8950-9F266C4565AE}"/>
+            </a:ext>
+          </a:extLst>
+        </p:cNvPr>
+        <p:cNvGrpSpPr/>
+        <p:nvPr/>
+      </p:nvGrpSpPr>
+      <p:grpSpPr>
+        <a:xfrm>
+          <a:off x="0" y="0"/>
+          <a:ext cx="0" cy="0"/>
+          <a:chOff x="0" y="0"/>
+          <a:chExt cx="0" cy="0"/>
+        </a:xfrm>
+      </p:grpSpPr>
+      <p:sp>
+        <p:nvSpPr>
+          <p:cNvPr id="2" name="Slide Image Placeholder 1">
+            <a:extLst>
+              <a:ext uri="{FF2B5EF4-FFF2-40B4-BE49-F238E27FC236}">
+                <a16:creationId xmlns:a16="http://schemas.microsoft.com/office/drawing/2014/main" id="{1E497E09-6D11-D0BA-D2D1-5B08FB997731}"/>
+              </a:ext>
+            </a:extLst>
+          </p:cNvPr>
+          <p:cNvSpPr>
+            <a:spLocks noGrp="1" noRot="1" noChangeAspect="1"/>
+          </p:cNvSpPr>
+          <p:nvPr>
+            <p:ph type="sldImg"/>
+          </p:nvPr>
+        </p:nvSpPr>
+        <p:spPr/>
+      </p:sp>
+      <p:sp>
+        <p:nvSpPr>
+          <p:cNvPr id="3" name="Notes Placeholder 2">
+            <a:extLst>
+              <a:ext uri="{FF2B5EF4-FFF2-40B4-BE49-F238E27FC236}">
+                <a16:creationId xmlns:a16="http://schemas.microsoft.com/office/drawing/2014/main" id="{9336C4A5-58A4-D062-54A6-1D67A978E992}"/>
+              </a:ext>
+            </a:extLst>
+          </p:cNvPr>
+          <p:cNvSpPr>
+            <a:spLocks noGrp="1"/>
+          </p:cNvSpPr>
+          <p:nvPr>
+            <p:ph type="body" idx="1"/>
+          </p:nvPr>
+        </p:nvSpPr>
+        <p:spPr/>
+        <p:txBody>
+          <a:bodyPr/>
+          <a:lstStyle/>
+          <a:p>
+            <a:endParaRPr lang="en-US" b="0" dirty="0">
+              <a:solidFill>
+                <a:srgbClr val="CCCCCC"/>
+              </a:solidFill>
+              <a:effectLst/>
+              <a:latin typeface="Menlo" panose="020B0609030804020204" pitchFamily="49" charset="0"/>
+            </a:endParaRPr>
+          </a:p>
+        </p:txBody>
+      </p:sp>
+      <p:sp>
+        <p:nvSpPr>
+          <p:cNvPr id="4" name="Slide Number Placeholder 3">
+            <a:extLst>
+              <a:ext uri="{FF2B5EF4-FFF2-40B4-BE49-F238E27FC236}">
+                <a16:creationId xmlns:a16="http://schemas.microsoft.com/office/drawing/2014/main" id="{9F3FD3E1-ECA8-7789-76B9-A150DB6276EE}"/>
+              </a:ext>
+            </a:extLst>
+          </p:cNvPr>
+          <p:cNvSpPr>
+            <a:spLocks noGrp="1"/>
+          </p:cNvSpPr>
+          <p:nvPr>
+            <p:ph type="sldNum" sz="quarter" idx="5"/>
+          </p:nvPr>
+        </p:nvSpPr>
+        <p:spPr/>
+        <p:txBody>
+          <a:bodyPr/>
+          <a:lstStyle/>
+          <a:p>
+            <a:fld id="{061BAA8C-FDC6-D345-B4E0-3B02449209FB}" type="slidenum">
+              <a:rPr lang="en-US" smtClean="0"/>
+              <a:t>7</a:t>
             </a:fld>
             <a:endParaRPr lang="en-US"/>
           </a:p>
@@ -1499,7 +1986,7 @@
           <a:p>
             <a:fld id="{80FC6068-BAFB-FC44-B9D8-F4B3BB105DE6}" type="datetimeFigureOut">
               <a:rPr lang="en-US" smtClean="0"/>
-              <a:t>3/25/24</a:t>
+              <a:t>3/27/24</a:t>
             </a:fld>
             <a:endParaRPr lang="en-US"/>
           </a:p>
@@ -1697,7 +2184,7 @@
           <a:p>
             <a:fld id="{80FC6068-BAFB-FC44-B9D8-F4B3BB105DE6}" type="datetimeFigureOut">
               <a:rPr lang="en-US" smtClean="0"/>
-              <a:t>3/25/24</a:t>
+              <a:t>3/27/24</a:t>
             </a:fld>
             <a:endParaRPr lang="en-US"/>
           </a:p>
@@ -1905,7 +2392,7 @@
           <a:p>
             <a:fld id="{80FC6068-BAFB-FC44-B9D8-F4B3BB105DE6}" type="datetimeFigureOut">
               <a:rPr lang="en-US" smtClean="0"/>
-              <a:t>3/25/24</a:t>
+              <a:t>3/27/24</a:t>
             </a:fld>
             <a:endParaRPr lang="en-US"/>
           </a:p>
@@ -2109,7 +2596,7 @@
           <a:p>
             <a:fld id="{80FC6068-BAFB-FC44-B9D8-F4B3BB105DE6}" type="datetimeFigureOut">
               <a:rPr lang="en-US" smtClean="0"/>
-              <a:t>3/25/24</a:t>
+              <a:t>3/27/24</a:t>
             </a:fld>
             <a:endParaRPr lang="en-US"/>
           </a:p>
@@ -2400,7 +2887,7 @@
           <a:p>
             <a:fld id="{80FC6068-BAFB-FC44-B9D8-F4B3BB105DE6}" type="datetimeFigureOut">
               <a:rPr lang="en-US" smtClean="0"/>
-              <a:t>3/25/24</a:t>
+              <a:t>3/27/24</a:t>
             </a:fld>
             <a:endParaRPr lang="en-US"/>
           </a:p>
@@ -2665,7 +3152,7 @@
           <a:p>
             <a:fld id="{80FC6068-BAFB-FC44-B9D8-F4B3BB105DE6}" type="datetimeFigureOut">
               <a:rPr lang="en-US" smtClean="0"/>
-              <a:t>3/25/24</a:t>
+              <a:t>3/27/24</a:t>
             </a:fld>
             <a:endParaRPr lang="en-US"/>
           </a:p>
@@ -3077,7 +3564,7 @@
           <a:p>
             <a:fld id="{80FC6068-BAFB-FC44-B9D8-F4B3BB105DE6}" type="datetimeFigureOut">
               <a:rPr lang="en-US" smtClean="0"/>
-              <a:t>3/25/24</a:t>
+              <a:t>3/27/24</a:t>
             </a:fld>
             <a:endParaRPr lang="en-US"/>
           </a:p>
@@ -3218,7 +3705,7 @@
           <a:p>
             <a:fld id="{80FC6068-BAFB-FC44-B9D8-F4B3BB105DE6}" type="datetimeFigureOut">
               <a:rPr lang="en-US" smtClean="0"/>
-              <a:t>3/25/24</a:t>
+              <a:t>3/27/24</a:t>
             </a:fld>
             <a:endParaRPr lang="en-US"/>
           </a:p>
@@ -3331,7 +3818,7 @@
           <a:p>
             <a:fld id="{80FC6068-BAFB-FC44-B9D8-F4B3BB105DE6}" type="datetimeFigureOut">
               <a:rPr lang="en-US" smtClean="0"/>
-              <a:t>3/25/24</a:t>
+              <a:t>3/27/24</a:t>
             </a:fld>
             <a:endParaRPr lang="en-US"/>
           </a:p>
@@ -3642,7 +4129,7 @@
           <a:p>
             <a:fld id="{80FC6068-BAFB-FC44-B9D8-F4B3BB105DE6}" type="datetimeFigureOut">
               <a:rPr lang="en-US" smtClean="0"/>
-              <a:t>3/25/24</a:t>
+              <a:t>3/27/24</a:t>
             </a:fld>
             <a:endParaRPr lang="en-US"/>
           </a:p>
@@ -3930,7 +4417,7 @@
           <a:p>
             <a:fld id="{80FC6068-BAFB-FC44-B9D8-F4B3BB105DE6}" type="datetimeFigureOut">
               <a:rPr lang="en-US" smtClean="0"/>
-              <a:t>3/25/24</a:t>
+              <a:t>3/27/24</a:t>
             </a:fld>
             <a:endParaRPr lang="en-US"/>
           </a:p>
@@ -4171,7 +4658,7 @@
           <a:p>
             <a:fld id="{80FC6068-BAFB-FC44-B9D8-F4B3BB105DE6}" type="datetimeFigureOut">
               <a:rPr lang="en-US" smtClean="0"/>
-              <a:t>3/25/24</a:t>
+              <a:t>3/27/24</a:t>
             </a:fld>
             <a:endParaRPr lang="en-US"/>
           </a:p>
@@ -4745,7 +5232,30 @@
           </a:bodyPr>
           <a:lstStyle/>
           <a:p>
-            <a:endParaRPr lang="en-US" dirty="0"/>
+            <a:r>
+              <a:rPr lang="en-US" dirty="0"/>
+              <a:t>Proliferation vs. activation comparison</a:t>
+            </a:r>
+          </a:p>
+          <a:p>
+            <a:r>
+              <a:rPr lang="en-US" dirty="0"/>
+              <a:t>TCR graphs</a:t>
+            </a:r>
+          </a:p>
+          <a:p>
+            <a:r>
+              <a:rPr lang="en-US" dirty="0"/>
+              <a:t>Progress on </a:t>
+            </a:r>
+            <a:r>
+              <a:rPr lang="en-US" dirty="0" err="1"/>
+              <a:t>ATACseq</a:t>
+            </a:r>
+            <a:r>
+              <a:rPr lang="en-US" dirty="0"/>
+              <a:t> Erin vs. Stephan method comparison</a:t>
+            </a:r>
           </a:p>
         </p:txBody>
       </p:sp>
@@ -4987,7 +5497,7 @@
         <p:cNvPr id="1" name="">
           <a:extLst>
             <a:ext uri="{FF2B5EF4-FFF2-40B4-BE49-F238E27FC236}">
-              <a16:creationId xmlns:a16="http://schemas.microsoft.com/office/drawing/2014/main" id="{5F63F271-7169-1115-1EF3-CE3BF477816E}"/>
+              <a16:creationId xmlns:a16="http://schemas.microsoft.com/office/drawing/2014/main" id="{B2EBB653-4350-C80D-242B-7831E70B3F5E}"/>
             </a:ext>
           </a:extLst>
         </p:cNvPr>
@@ -5004,10 +5514,10 @@
       </p:grpSpPr>
       <p:sp>
         <p:nvSpPr>
-          <p:cNvPr id="2" name="Title 1">
-            <a:extLst>
-              <a:ext uri="{FF2B5EF4-FFF2-40B4-BE49-F238E27FC236}">
-                <a16:creationId xmlns:a16="http://schemas.microsoft.com/office/drawing/2014/main" id="{FA6F45DB-D64D-9355-7CD2-66B994D6E22E}"/>
+          <p:cNvPr id="10" name="Title 1">
+            <a:extLst>
+              <a:ext uri="{FF2B5EF4-FFF2-40B4-BE49-F238E27FC236}">
+                <a16:creationId xmlns:a16="http://schemas.microsoft.com/office/drawing/2014/main" id="{312D7593-2E1E-F959-D988-8539EB9E3982}"/>
               </a:ext>
             </a:extLst>
           </p:cNvPr>
@@ -5021,62 +5531,72 @@
         <p:spPr>
           <a:xfrm>
             <a:off x="838199" y="593725"/>
-            <a:ext cx="10533994" cy="1325563"/>
+            <a:ext cx="10224911" cy="1384977"/>
           </a:xfrm>
         </p:spPr>
         <p:txBody>
           <a:bodyPr>
-            <a:normAutofit/>
+            <a:normAutofit fontScale="90000"/>
           </a:bodyPr>
           <a:lstStyle/>
           <a:p>
             <a:r>
               <a:rPr lang="en-US" dirty="0"/>
-              <a:t>Conclusions</a:t>
-            </a:r>
-          </a:p>
-        </p:txBody>
-      </p:sp>
-      <p:sp>
-        <p:nvSpPr>
-          <p:cNvPr id="3" name="Content Placeholder 2">
-            <a:extLst>
-              <a:ext uri="{FF2B5EF4-FFF2-40B4-BE49-F238E27FC236}">
-                <a16:creationId xmlns:a16="http://schemas.microsoft.com/office/drawing/2014/main" id="{28955BE2-D76F-6F20-59F9-5AB74A7BB43C}"/>
-              </a:ext>
-            </a:extLst>
-          </p:cNvPr>
-          <p:cNvSpPr>
-            <a:spLocks noGrp="1"/>
-          </p:cNvSpPr>
-          <p:nvPr>
-            <p:ph idx="1"/>
-          </p:nvPr>
-        </p:nvSpPr>
+              <a:t>Some activation markers appear higher in ICI colitis tissue (</a:t>
+            </a:r>
+            <a:r>
+              <a:rPr lang="en-US" dirty="0" err="1"/>
+              <a:t>Luoma</a:t>
+            </a:r>
+            <a:r>
+              <a:rPr lang="en-US" dirty="0"/>
+              <a:t> (2020), </a:t>
+            </a:r>
+            <a:r>
+              <a:rPr lang="en-US" i="1" dirty="0"/>
+              <a:t>Cell</a:t>
+            </a:r>
+            <a:r>
+              <a:rPr lang="en-US" dirty="0"/>
+              <a:t> dataset), but no significant differences</a:t>
+            </a:r>
+          </a:p>
+        </p:txBody>
+      </p:sp>
+      <p:pic>
+        <p:nvPicPr>
+          <p:cNvPr id="2" name="Picture 1">
+            <a:extLst>
+              <a:ext uri="{FF2B5EF4-FFF2-40B4-BE49-F238E27FC236}">
+                <a16:creationId xmlns:a16="http://schemas.microsoft.com/office/drawing/2014/main" id="{24560D11-F893-F18A-547C-F3B373080A96}"/>
+              </a:ext>
+            </a:extLst>
+          </p:cNvPr>
+          <p:cNvPicPr>
+            <a:picLocks noChangeAspect="1"/>
+          </p:cNvPicPr>
+          <p:nvPr/>
+        </p:nvPicPr>
+        <p:blipFill>
+          <a:blip r:embed="rId3"/>
+          <a:stretch>
+            <a:fillRect/>
+          </a:stretch>
+        </p:blipFill>
         <p:spPr>
           <a:xfrm>
-            <a:off x="838200" y="1919289"/>
-            <a:ext cx="10460421" cy="4623402"/>
+            <a:off x="1968061" y="1853930"/>
+            <a:ext cx="7772400" cy="4915876"/>
           </a:xfrm>
+          <a:prstGeom prst="rect">
+            <a:avLst/>
+          </a:prstGeom>
         </p:spPr>
-        <p:txBody>
-          <a:bodyPr>
-            <a:normAutofit/>
-          </a:bodyPr>
-          <a:lstStyle/>
-          <a:p>
-            <a:pPr marL="514350" indent="-514350">
-              <a:buFont typeface="+mj-lt"/>
-              <a:buAutoNum type="arabicPeriod"/>
-            </a:pPr>
-            <a:endParaRPr lang="en-US" dirty="0"/>
-          </a:p>
-        </p:txBody>
-      </p:sp>
+      </p:pic>
     </p:spTree>
     <p:extLst>
       <p:ext uri="{BB962C8B-B14F-4D97-AF65-F5344CB8AC3E}">
-        <p14:creationId xmlns:p14="http://schemas.microsoft.com/office/powerpoint/2010/main" val="33705843"/>
+        <p14:creationId xmlns:p14="http://schemas.microsoft.com/office/powerpoint/2010/main" val="3509043603"/>
       </p:ext>
     </p:extLst>
   </p:cSld>
@@ -5087,6 +5607,263 @@
 </file>
 
 <file path=ppt/slides/slide5.xml><?xml version="1.0" encoding="utf-8"?>
+<p:sld xmlns:a="http://schemas.openxmlformats.org/drawingml/2006/main" xmlns:r="http://schemas.openxmlformats.org/officeDocument/2006/relationships" xmlns:p="http://schemas.openxmlformats.org/presentationml/2006/main">
+  <p:cSld>
+    <p:spTree>
+      <p:nvGrpSpPr>
+        <p:cNvPr id="1" name="">
+          <a:extLst>
+            <a:ext uri="{FF2B5EF4-FFF2-40B4-BE49-F238E27FC236}">
+              <a16:creationId xmlns:a16="http://schemas.microsoft.com/office/drawing/2014/main" id="{B2EBB653-4350-C80D-242B-7831E70B3F5E}"/>
+            </a:ext>
+          </a:extLst>
+        </p:cNvPr>
+        <p:cNvGrpSpPr/>
+        <p:nvPr/>
+      </p:nvGrpSpPr>
+      <p:grpSpPr>
+        <a:xfrm>
+          <a:off x="0" y="0"/>
+          <a:ext cx="0" cy="0"/>
+          <a:chOff x="0" y="0"/>
+          <a:chExt cx="0" cy="0"/>
+        </a:xfrm>
+      </p:grpSpPr>
+      <p:sp>
+        <p:nvSpPr>
+          <p:cNvPr id="10" name="Title 1">
+            <a:extLst>
+              <a:ext uri="{FF2B5EF4-FFF2-40B4-BE49-F238E27FC236}">
+                <a16:creationId xmlns:a16="http://schemas.microsoft.com/office/drawing/2014/main" id="{312D7593-2E1E-F959-D988-8539EB9E3982}"/>
+              </a:ext>
+            </a:extLst>
+          </p:cNvPr>
+          <p:cNvSpPr>
+            <a:spLocks noGrp="1"/>
+          </p:cNvSpPr>
+          <p:nvPr>
+            <p:ph type="title"/>
+          </p:nvPr>
+        </p:nvSpPr>
+        <p:spPr>
+          <a:xfrm>
+            <a:off x="838199" y="593725"/>
+            <a:ext cx="10224911" cy="1384977"/>
+          </a:xfrm>
+        </p:spPr>
+        <p:txBody>
+          <a:bodyPr>
+            <a:normAutofit fontScale="90000"/>
+          </a:bodyPr>
+          <a:lstStyle/>
+          <a:p>
+            <a:r>
+              <a:rPr lang="en-US" dirty="0"/>
+              <a:t>TCR graphs similar between </a:t>
+            </a:r>
+            <a:r>
+              <a:rPr lang="en-US" dirty="0" err="1"/>
+              <a:t>irAE</a:t>
+            </a:r>
+            <a:r>
+              <a:rPr lang="en-US" dirty="0"/>
+              <a:t> groups (</a:t>
+            </a:r>
+            <a:r>
+              <a:rPr lang="en-US" dirty="0" err="1"/>
+              <a:t>Luoma</a:t>
+            </a:r>
+            <a:r>
+              <a:rPr lang="en-US" dirty="0"/>
+              <a:t> (2020), </a:t>
+            </a:r>
+            <a:r>
+              <a:rPr lang="en-US" i="1" dirty="0"/>
+              <a:t>Cell</a:t>
+            </a:r>
+            <a:r>
+              <a:rPr lang="en-US" dirty="0"/>
+              <a:t> dataset), perhaps slightly higher connectivity (2*edges/vertices) in </a:t>
+            </a:r>
+            <a:r>
+              <a:rPr lang="en-US" dirty="0" err="1"/>
+              <a:t>irAE</a:t>
+            </a:r>
+            <a:r>
+              <a:rPr lang="en-US" dirty="0"/>
+              <a:t> group</a:t>
+            </a:r>
+          </a:p>
+        </p:txBody>
+      </p:sp>
+      <p:pic>
+        <p:nvPicPr>
+          <p:cNvPr id="2" name="Picture 1">
+            <a:extLst>
+              <a:ext uri="{FF2B5EF4-FFF2-40B4-BE49-F238E27FC236}">
+                <a16:creationId xmlns:a16="http://schemas.microsoft.com/office/drawing/2014/main" id="{6CD6EAC0-7A07-B4B8-B04D-A5FBC9F45186}"/>
+              </a:ext>
+            </a:extLst>
+          </p:cNvPr>
+          <p:cNvPicPr>
+            <a:picLocks noChangeAspect="1"/>
+          </p:cNvPicPr>
+          <p:nvPr/>
+        </p:nvPicPr>
+        <p:blipFill>
+          <a:blip r:embed="rId3"/>
+          <a:stretch>
+            <a:fillRect/>
+          </a:stretch>
+        </p:blipFill>
+        <p:spPr>
+          <a:xfrm>
+            <a:off x="0" y="2368209"/>
+            <a:ext cx="5683469" cy="3622063"/>
+          </a:xfrm>
+          <a:prstGeom prst="rect">
+            <a:avLst/>
+          </a:prstGeom>
+        </p:spPr>
+      </p:pic>
+      <p:pic>
+        <p:nvPicPr>
+          <p:cNvPr id="6" name="Picture 5">
+            <a:extLst>
+              <a:ext uri="{FF2B5EF4-FFF2-40B4-BE49-F238E27FC236}">
+                <a16:creationId xmlns:a16="http://schemas.microsoft.com/office/drawing/2014/main" id="{310F31B3-3B33-B82B-3FB4-D41D6FAB6C7B}"/>
+              </a:ext>
+            </a:extLst>
+          </p:cNvPr>
+          <p:cNvPicPr>
+            <a:picLocks noChangeAspect="1"/>
+          </p:cNvPicPr>
+          <p:nvPr/>
+        </p:nvPicPr>
+        <p:blipFill>
+          <a:blip r:embed="rId4"/>
+          <a:stretch>
+            <a:fillRect/>
+          </a:stretch>
+        </p:blipFill>
+        <p:spPr>
+          <a:xfrm>
+            <a:off x="6172054" y="2368208"/>
+            <a:ext cx="5723029" cy="3622064"/>
+          </a:xfrm>
+          <a:prstGeom prst="rect">
+            <a:avLst/>
+          </a:prstGeom>
+        </p:spPr>
+      </p:pic>
+      <p:sp>
+        <p:nvSpPr>
+          <p:cNvPr id="8" name="TextBox 7">
+            <a:extLst>
+              <a:ext uri="{FF2B5EF4-FFF2-40B4-BE49-F238E27FC236}">
+                <a16:creationId xmlns:a16="http://schemas.microsoft.com/office/drawing/2014/main" id="{8B977362-0B79-8251-D2B2-753DCB25C4E6}"/>
+              </a:ext>
+            </a:extLst>
+          </p:cNvPr>
+          <p:cNvSpPr txBox="1"/>
+          <p:nvPr/>
+        </p:nvSpPr>
+        <p:spPr>
+          <a:xfrm>
+            <a:off x="114081" y="5802610"/>
+            <a:ext cx="6096000" cy="923330"/>
+          </a:xfrm>
+          <a:prstGeom prst="rect">
+            <a:avLst/>
+          </a:prstGeom>
+          <a:noFill/>
+        </p:spPr>
+        <p:txBody>
+          <a:bodyPr wrap="square">
+            <a:spAutoFit/>
+          </a:bodyPr>
+          <a:lstStyle/>
+          <a:p>
+            <a:r>
+              <a:rPr lang="en-US" dirty="0"/>
+              <a:t>Average Connectivity: 1.029762</a:t>
+            </a:r>
+          </a:p>
+          <a:p>
+            <a:r>
+              <a:rPr lang="en-US" dirty="0"/>
+              <a:t>Number of Edges: 173</a:t>
+            </a:r>
+          </a:p>
+          <a:p>
+            <a:r>
+              <a:rPr lang="en-US" dirty="0"/>
+              <a:t>Number of Vertices: 336 </a:t>
+            </a:r>
+          </a:p>
+        </p:txBody>
+      </p:sp>
+      <p:sp>
+        <p:nvSpPr>
+          <p:cNvPr id="11" name="TextBox 10">
+            <a:extLst>
+              <a:ext uri="{FF2B5EF4-FFF2-40B4-BE49-F238E27FC236}">
+                <a16:creationId xmlns:a16="http://schemas.microsoft.com/office/drawing/2014/main" id="{387553FB-7E91-E52C-ED98-2C546F103198}"/>
+              </a:ext>
+            </a:extLst>
+          </p:cNvPr>
+          <p:cNvSpPr txBox="1"/>
+          <p:nvPr/>
+        </p:nvSpPr>
+        <p:spPr>
+          <a:xfrm>
+            <a:off x="6210081" y="5802610"/>
+            <a:ext cx="6096000" cy="923330"/>
+          </a:xfrm>
+          <a:prstGeom prst="rect">
+            <a:avLst/>
+          </a:prstGeom>
+          <a:noFill/>
+        </p:spPr>
+        <p:txBody>
+          <a:bodyPr wrap="square">
+            <a:spAutoFit/>
+          </a:bodyPr>
+          <a:lstStyle/>
+          <a:p>
+            <a:r>
+              <a:rPr lang="en-US" dirty="0"/>
+              <a:t>Average Connectivity: 1.258687</a:t>
+            </a:r>
+          </a:p>
+          <a:p>
+            <a:r>
+              <a:rPr lang="en-US" dirty="0"/>
+              <a:t>Number of Edges: 163</a:t>
+            </a:r>
+          </a:p>
+          <a:p>
+            <a:r>
+              <a:rPr lang="en-US" dirty="0"/>
+              <a:t>Number of Vertices: 259 </a:t>
+            </a:r>
+          </a:p>
+        </p:txBody>
+      </p:sp>
+    </p:spTree>
+    <p:extLst>
+      <p:ext uri="{BB962C8B-B14F-4D97-AF65-F5344CB8AC3E}">
+        <p14:creationId xmlns:p14="http://schemas.microsoft.com/office/powerpoint/2010/main" val="1402837956"/>
+      </p:ext>
+    </p:extLst>
+  </p:cSld>
+  <p:clrMapOvr>
+    <a:masterClrMapping/>
+  </p:clrMapOvr>
+</p:sld>
+</file>
+
+<file path=ppt/slides/slide6.xml><?xml version="1.0" encoding="utf-8"?>
 <p:sld xmlns:a="http://schemas.openxmlformats.org/drawingml/2006/main" xmlns:r="http://schemas.openxmlformats.org/officeDocument/2006/relationships" xmlns:p="http://schemas.openxmlformats.org/presentationml/2006/main">
   <p:cSld>
     <p:spTree>
@@ -5139,6 +5916,154 @@
           <a:p>
             <a:r>
               <a:rPr lang="en-US" dirty="0"/>
+              <a:t>Conclusions</a:t>
+            </a:r>
+          </a:p>
+        </p:txBody>
+      </p:sp>
+      <p:sp>
+        <p:nvSpPr>
+          <p:cNvPr id="3" name="Content Placeholder 2">
+            <a:extLst>
+              <a:ext uri="{FF2B5EF4-FFF2-40B4-BE49-F238E27FC236}">
+                <a16:creationId xmlns:a16="http://schemas.microsoft.com/office/drawing/2014/main" id="{28955BE2-D76F-6F20-59F9-5AB74A7BB43C}"/>
+              </a:ext>
+            </a:extLst>
+          </p:cNvPr>
+          <p:cNvSpPr>
+            <a:spLocks noGrp="1"/>
+          </p:cNvSpPr>
+          <p:nvPr>
+            <p:ph idx="1"/>
+          </p:nvPr>
+        </p:nvSpPr>
+        <p:spPr>
+          <a:xfrm>
+            <a:off x="838200" y="1919289"/>
+            <a:ext cx="10460421" cy="4623402"/>
+          </a:xfrm>
+        </p:spPr>
+        <p:txBody>
+          <a:bodyPr>
+            <a:normAutofit/>
+          </a:bodyPr>
+          <a:lstStyle/>
+          <a:p>
+            <a:pPr marL="514350" indent="-514350">
+              <a:buFont typeface="+mj-lt"/>
+              <a:buAutoNum type="arabicPeriod"/>
+            </a:pPr>
+            <a:r>
+              <a:rPr lang="en-US" dirty="0"/>
+              <a:t>Not shown: Erin’s </a:t>
+            </a:r>
+            <a:r>
+              <a:rPr lang="en-US" dirty="0" err="1"/>
+              <a:t>ATACseq</a:t>
+            </a:r>
+            <a:r>
+              <a:rPr lang="en-US" dirty="0"/>
+              <a:t>, comparing Stephan’s method vs. Erin’s method</a:t>
+            </a:r>
+          </a:p>
+          <a:p>
+            <a:pPr marL="971550" lvl="1" indent="-514350">
+              <a:buFont typeface="+mj-lt"/>
+              <a:buAutoNum type="alphaLcParenR"/>
+            </a:pPr>
+            <a:r>
+              <a:rPr lang="en-US" dirty="0"/>
+              <a:t>Merged alignment files by condition/timepoint</a:t>
+            </a:r>
+          </a:p>
+          <a:p>
+            <a:pPr marL="971550" lvl="1" indent="-514350">
+              <a:buFont typeface="+mj-lt"/>
+              <a:buAutoNum type="alphaLcParenR"/>
+            </a:pPr>
+            <a:r>
+              <a:rPr lang="en-US" dirty="0"/>
+              <a:t>Ran peak caller on merged alignment files</a:t>
+            </a:r>
+          </a:p>
+          <a:p>
+            <a:pPr marL="971550" lvl="1" indent="-514350">
+              <a:buFont typeface="+mj-lt"/>
+              <a:buAutoNum type="alphaLcParenR"/>
+            </a:pPr>
+            <a:r>
+              <a:rPr lang="en-US" dirty="0"/>
+              <a:t>TODO: differentially accessible gene analysis (volcano plot comparison)</a:t>
+            </a:r>
+          </a:p>
+        </p:txBody>
+      </p:sp>
+    </p:spTree>
+    <p:extLst>
+      <p:ext uri="{BB962C8B-B14F-4D97-AF65-F5344CB8AC3E}">
+        <p14:creationId xmlns:p14="http://schemas.microsoft.com/office/powerpoint/2010/main" val="33705843"/>
+      </p:ext>
+    </p:extLst>
+  </p:cSld>
+  <p:clrMapOvr>
+    <a:masterClrMapping/>
+  </p:clrMapOvr>
+</p:sld>
+</file>
+
+<file path=ppt/slides/slide7.xml><?xml version="1.0" encoding="utf-8"?>
+<p:sld xmlns:a="http://schemas.openxmlformats.org/drawingml/2006/main" xmlns:r="http://schemas.openxmlformats.org/officeDocument/2006/relationships" xmlns:p="http://schemas.openxmlformats.org/presentationml/2006/main">
+  <p:cSld>
+    <p:spTree>
+      <p:nvGrpSpPr>
+        <p:cNvPr id="1" name="">
+          <a:extLst>
+            <a:ext uri="{FF2B5EF4-FFF2-40B4-BE49-F238E27FC236}">
+              <a16:creationId xmlns:a16="http://schemas.microsoft.com/office/drawing/2014/main" id="{5F63F271-7169-1115-1EF3-CE3BF477816E}"/>
+            </a:ext>
+          </a:extLst>
+        </p:cNvPr>
+        <p:cNvGrpSpPr/>
+        <p:nvPr/>
+      </p:nvGrpSpPr>
+      <p:grpSpPr>
+        <a:xfrm>
+          <a:off x="0" y="0"/>
+          <a:ext cx="0" cy="0"/>
+          <a:chOff x="0" y="0"/>
+          <a:chExt cx="0" cy="0"/>
+        </a:xfrm>
+      </p:grpSpPr>
+      <p:sp>
+        <p:nvSpPr>
+          <p:cNvPr id="2" name="Title 1">
+            <a:extLst>
+              <a:ext uri="{FF2B5EF4-FFF2-40B4-BE49-F238E27FC236}">
+                <a16:creationId xmlns:a16="http://schemas.microsoft.com/office/drawing/2014/main" id="{FA6F45DB-D64D-9355-7CD2-66B994D6E22E}"/>
+              </a:ext>
+            </a:extLst>
+          </p:cNvPr>
+          <p:cNvSpPr>
+            <a:spLocks noGrp="1"/>
+          </p:cNvSpPr>
+          <p:nvPr>
+            <p:ph type="title"/>
+          </p:nvPr>
+        </p:nvSpPr>
+        <p:spPr>
+          <a:xfrm>
+            <a:off x="838199" y="593725"/>
+            <a:ext cx="10533994" cy="1325563"/>
+          </a:xfrm>
+        </p:spPr>
+        <p:txBody>
+          <a:bodyPr>
+            <a:normAutofit/>
+          </a:bodyPr>
+          <a:lstStyle/>
+          <a:p>
+            <a:r>
+              <a:rPr lang="en-US" dirty="0"/>
               <a:t>Next steps</a:t>
             </a:r>
           </a:p>
@@ -5176,7 +6101,28 @@
               <a:buFont typeface="+mj-lt"/>
               <a:buAutoNum type="arabicPeriod"/>
             </a:pPr>
-            <a:endParaRPr lang="en-US" dirty="0"/>
+            <a:r>
+              <a:rPr lang="en-US" dirty="0"/>
+              <a:t>Worth trying to make activated (CD4) cell type category to compare abundances between </a:t>
+            </a:r>
+            <a:r>
+              <a:rPr lang="en-US" dirty="0" err="1"/>
+              <a:t>irAE</a:t>
+            </a:r>
+            <a:r>
+              <a:rPr lang="en-US" dirty="0"/>
+              <a:t> groups?</a:t>
+            </a:r>
+          </a:p>
+          <a:p>
+            <a:pPr marL="971550" lvl="1" indent="-514350">
+              <a:buFont typeface="+mj-lt"/>
+              <a:buAutoNum type="alphaLcParenR"/>
+            </a:pPr>
+            <a:r>
+              <a:rPr lang="en-US" dirty="0"/>
+              <a:t>Would need to set thresholds for +/- for markers like CD154, CD38, HLA-DR(A/B1)</a:t>
+            </a:r>
           </a:p>
         </p:txBody>
       </p:sp>

</xml_diff>